<commit_message>
Dashboard final version (presentation)
</commit_message>
<xml_diff>
--- a/presentation.pptx
+++ b/presentation.pptx
@@ -3480,7 +3480,7 @@
                 <a:schemeClr val="tx1"/>
               </a:solidFill>
             </a:rPr>
-            <a:t>(π.χ. Πειραιάς)</a:t>
+            <a:t>(π.χ. Θεσσαλονίκη)</a:t>
           </a:r>
         </a:p>
       </dgm:t>
@@ -4979,7 +4979,7 @@
                 <a:schemeClr val="tx1"/>
               </a:solidFill>
             </a:rPr>
-            <a:t>(π.χ. Πειραιάς)</a:t>
+            <a:t>(π.χ. Θεσσαλονίκη)</a:t>
           </a:r>
         </a:p>
       </dsp:txBody>
@@ -16250,7 +16250,7 @@
             <a:pPr rtl="0"/>
             <a:fld id="{0ACE4C85-B24E-4BED-A39E-A6C6F73BAE92}" type="datetime1">
               <a:rPr lang="el-GR" smtClean="0"/>
-              <a:t>14/6/2023</a:t>
+              <a:t>15/6/2023</a:t>
             </a:fld>
             <a:endParaRPr lang="en-US" dirty="0"/>
           </a:p>
@@ -16424,7 +16424,7 @@
             <a:pPr rtl="0"/>
             <a:fld id="{5C7A2B91-3B09-44FD-A477-182CF78ED0F7}" type="datetime1">
               <a:rPr lang="el-GR" smtClean="0"/>
-              <a:t>14/6/2023</a:t>
+              <a:t>15/6/2023</a:t>
             </a:fld>
             <a:endParaRPr lang="en-US"/>
           </a:p>
@@ -17181,7 +17181,7 @@
           <a:p>
             <a:fld id="{F7FC7B9D-A4AB-4C53-B48B-3514F4658CC4}" type="datetime1">
               <a:rPr lang="el-GR" smtClean="0"/>
-              <a:t>14/6/2023</a:t>
+              <a:t>15/6/2023</a:t>
             </a:fld>
             <a:endParaRPr lang="en-US" dirty="0"/>
           </a:p>
@@ -17447,7 +17447,7 @@
           <a:p>
             <a:fld id="{BBCBEE1F-2D1B-4834-B6C7-0E225F80A345}" type="datetime1">
               <a:rPr lang="el-GR" smtClean="0"/>
-              <a:t>14/6/2023</a:t>
+              <a:t>15/6/2023</a:t>
             </a:fld>
             <a:endParaRPr lang="en-US"/>
           </a:p>
@@ -17701,7 +17701,7 @@
           <a:p>
             <a:fld id="{7EF6C84B-EA03-4A3F-96B3-CBD31353B318}" type="datetime1">
               <a:rPr lang="el-GR" smtClean="0"/>
-              <a:t>14/6/2023</a:t>
+              <a:t>15/6/2023</a:t>
             </a:fld>
             <a:endParaRPr lang="en-US"/>
           </a:p>
@@ -17945,7 +17945,7 @@
           <a:p>
             <a:fld id="{0124828C-503A-40AD-8F45-03425900F5CB}" type="datetime1">
               <a:rPr lang="el-GR" smtClean="0"/>
-              <a:t>14/6/2023</a:t>
+              <a:t>15/6/2023</a:t>
             </a:fld>
             <a:endParaRPr lang="en-US"/>
           </a:p>
@@ -18573,7 +18573,7 @@
           <a:p>
             <a:fld id="{12D0E41B-AF26-4722-8FB2-DE54CE5BA97A}" type="datetime1">
               <a:rPr lang="el-GR" smtClean="0"/>
-              <a:t>14/6/2023</a:t>
+              <a:t>15/6/2023</a:t>
             </a:fld>
             <a:endParaRPr dirty="0"/>
           </a:p>
@@ -18961,7 +18961,7 @@
           <a:p>
             <a:fld id="{7BBF02F4-3AEC-4DED-91A6-A57F379D77CF}" type="datetime1">
               <a:rPr lang="el-GR" smtClean="0"/>
-              <a:t>14/6/2023</a:t>
+              <a:t>15/6/2023</a:t>
             </a:fld>
             <a:endParaRPr lang="en-US"/>
           </a:p>
@@ -19481,7 +19481,7 @@
           <a:p>
             <a:fld id="{4BE43C24-A958-4940-B28B-EFBEE4DE040C}" type="datetime1">
               <a:rPr lang="el-GR" smtClean="0"/>
-              <a:t>14/6/2023</a:t>
+              <a:t>15/6/2023</a:t>
             </a:fld>
             <a:endParaRPr lang="en-US"/>
           </a:p>
@@ -19637,7 +19637,7 @@
           <a:p>
             <a:fld id="{2D38D8A3-5F32-4B76-B24A-5E53E24EF233}" type="datetime1">
               <a:rPr lang="el-GR" smtClean="0"/>
-              <a:t>14/6/2023</a:t>
+              <a:t>15/6/2023</a:t>
             </a:fld>
             <a:endParaRPr lang="en-US"/>
           </a:p>
@@ -19761,7 +19761,7 @@
           <a:p>
             <a:fld id="{E0328A71-A3D1-4FD4-847A-BEDDC42C183C}" type="datetime1">
               <a:rPr lang="el-GR" smtClean="0"/>
-              <a:t>14/6/2023</a:t>
+              <a:t>15/6/2023</a:t>
             </a:fld>
             <a:endParaRPr lang="en-US"/>
           </a:p>
@@ -20226,7 +20226,7 @@
           <a:p>
             <a:fld id="{E80C6A34-B709-4A8B-8152-7BC6AE4F7B0F}" type="datetime1">
               <a:rPr lang="el-GR" smtClean="0"/>
-              <a:t>14/6/2023</a:t>
+              <a:t>15/6/2023</a:t>
             </a:fld>
             <a:endParaRPr lang="en-US"/>
           </a:p>
@@ -20523,7 +20523,7 @@
           <a:p>
             <a:fld id="{C9839D77-AFCF-4096-9832-DB215A1EE0E2}" type="datetime1">
               <a:rPr lang="el-GR" smtClean="0"/>
-              <a:t>14/6/2023</a:t>
+              <a:t>15/6/2023</a:t>
             </a:fld>
             <a:endParaRPr lang="en-US" dirty="0"/>
           </a:p>
@@ -21068,7 +21068,7 @@
           <a:p>
             <a:fld id="{00A0731E-C089-458C-9384-6FD334FD4ADE}" type="datetime1">
               <a:rPr lang="el-GR" smtClean="0"/>
-              <a:t>14/6/2023</a:t>
+              <a:t>15/6/2023</a:t>
             </a:fld>
             <a:endParaRPr lang="en-US" dirty="0"/>
           </a:p>
@@ -21762,7 +21762,7 @@
                 <a:latin typeface="Arial" panose="020B0604020202020204" pitchFamily="34" charset="0"/>
                 <a:cs typeface="Arial" panose="020B0604020202020204" pitchFamily="34" charset="0"/>
               </a:rPr>
-              <a:t>ΑΝΑΛΥΣΗ ΔΕΔΟΜΕΜΩΝ </a:t>
+              <a:t>ΑΝΑΛΥΣΗ ΔΕΔΟΜΕΝΩΝ </a:t>
             </a:r>
             <a:r>
               <a:rPr lang="el-GR" sz="2400" dirty="0" err="1">
@@ -33614,7 +33614,7 @@
         <p:spPr>
           <a:xfrm>
             <a:off x="6333952" y="4269783"/>
-            <a:ext cx="2332042" cy="1569660"/>
+            <a:ext cx="2332042" cy="1384995"/>
           </a:xfrm>
           <a:prstGeom prst="rect">
             <a:avLst/>
@@ -33631,13 +33631,10 @@
               <a:buChar char="•"/>
             </a:pPr>
             <a:r>
-              <a:rPr lang="el-GR" sz="1200" b="1" noProof="1"/>
-              <a:t>Στατιστικά δεδομένα </a:t>
+              <a:rPr lang="en-US" sz="1200" b="1" noProof="1"/>
+              <a:t>Plotly</a:t>
             </a:r>
-            <a:r>
-              <a:rPr lang="el-GR" sz="1200" noProof="1"/>
-              <a:t>αγγελιών 5 ημερών</a:t>
-            </a:r>
+            <a:endParaRPr lang="el-GR" sz="1200" b="1" noProof="1"/>
           </a:p>
           <a:p>
             <a:pPr algn="just"/>
@@ -33700,7 +33697,7 @@
         <p:spPr>
           <a:xfrm>
             <a:off x="8842257" y="4226397"/>
-            <a:ext cx="1921931" cy="1164678"/>
+            <a:ext cx="1921931" cy="1441677"/>
           </a:xfrm>
           <a:prstGeom prst="rect">
             <a:avLst/>
@@ -33711,6 +33708,19 @@
             <a:spAutoFit/>
           </a:bodyPr>
           <a:lstStyle/>
+          <a:p>
+            <a:pPr marL="171450" indent="-171450" algn="just">
+              <a:lnSpc>
+                <a:spcPct val="150000"/>
+              </a:lnSpc>
+              <a:buFont typeface="Arial" panose="020B0604020202020204" pitchFamily="34" charset="0"/>
+              <a:buChar char="•"/>
+            </a:pPr>
+            <a:r>
+              <a:rPr lang="en-US" sz="1200" b="1" noProof="1"/>
+              <a:t>Dash</a:t>
+            </a:r>
+          </a:p>
           <a:p>
             <a:pPr marL="171450" indent="-171450" algn="just">
               <a:lnSpc>
@@ -37666,7 +37676,7 @@
               </a:pPr>
               <a:r>
                 <a:rPr lang="el-GR" sz="1400" kern="1200" dirty="0"/>
-                <a:t>Όροφος: “[1oς, 2oς]”</a:t>
+                <a:t>Όροφος: “[Ισόγειο, 1oς]”</a:t>
               </a:r>
             </a:p>
             <a:p>
@@ -37688,7 +37698,7 @@
               </a:r>
               <a:r>
                 <a:rPr lang="el-GR" sz="1400" kern="1200" dirty="0"/>
-                <a:t>: 1</a:t>
+                <a:t>: 0</a:t>
               </a:r>
             </a:p>
             <a:p>
@@ -37710,7 +37720,7 @@
               </a:r>
               <a:r>
                 <a:rPr lang="el-GR" sz="1400" kern="1200" dirty="0"/>
-                <a:t>: 2</a:t>
+                <a:t>: 1</a:t>
               </a:r>
             </a:p>
             <a:p>
@@ -37887,21 +37897,14 @@
                 <a:buNone/>
               </a:pPr>
               <a:r>
-                <a:rPr lang="el-GR" sz="1400" kern="1200" dirty="0"/>
-                <a:t>Πλήθος </a:t>
-              </a:r>
-              <a:r>
                 <a:rPr lang="el-GR" sz="1400" b="1" kern="1200" dirty="0"/>
-                <a:t>ημερών</a:t>
+                <a:t>Παλαιότητα δημοσίευσης</a:t>
               </a:r>
               <a:r>
                 <a:rPr lang="el-GR" sz="1400" kern="1200" dirty="0"/>
-                <a:t> πριν από </a:t>
+                <a:t>: 2 (από ημερομηνία αναφοράς)</a:t>
               </a:r>
-              <a:r>
-                <a:rPr lang="el-GR" sz="1400" b="1" kern="1200" dirty="0"/>
-                <a:t>01/06/2023</a:t>
-              </a:r>
+              <a:endParaRPr lang="el-GR" sz="1400" b="1" kern="1200" dirty="0"/>
             </a:p>
           </p:txBody>
         </p:sp>
@@ -38116,7 +38119,7 @@
           <p:nvPr>
             <p:extLst>
               <p:ext uri="{D42A27DB-BD31-4B8C-83A1-F6EECF244321}">
-                <p14:modId xmlns:p14="http://schemas.microsoft.com/office/powerpoint/2010/main" val="3317634866"/>
+                <p14:modId xmlns:p14="http://schemas.microsoft.com/office/powerpoint/2010/main" val="2152561589"/>
               </p:ext>
             </p:extLst>
           </p:nvPr>

</xml_diff>